<commit_message>
Update Developer Guide and PPP
</commit_message>
<xml_diff>
--- a/docs/diagrams/ModelComponentWithActivityList.pptx
+++ b/docs/diagrams/ModelComponentWithActivityList.pptx
@@ -208,7 +208,7 @@
           <a:p>
             <a:fld id="{F5CC4B3F-88C1-4FFA-B1B6-F41C21DC6924}" type="datetimeFigureOut">
               <a:rPr lang="en-US" smtClean="0"/>
-              <a:t>3/18/19</a:t>
+              <a:t>4/8/19</a:t>
             </a:fld>
             <a:endParaRPr lang="en-US"/>
           </a:p>
@@ -654,7 +654,7 @@
           <a:p>
             <a:fld id="{78C97017-6FC3-485B-9764-EAC9E56C1D49}" type="datetimeFigureOut">
               <a:rPr lang="en-US" smtClean="0"/>
-              <a:t>3/18/19</a:t>
+              <a:t>4/8/19</a:t>
             </a:fld>
             <a:endParaRPr lang="en-US"/>
           </a:p>
@@ -822,7 +822,7 @@
           <a:p>
             <a:fld id="{78C97017-6FC3-485B-9764-EAC9E56C1D49}" type="datetimeFigureOut">
               <a:rPr lang="en-US" smtClean="0"/>
-              <a:t>3/18/19</a:t>
+              <a:t>4/8/19</a:t>
             </a:fld>
             <a:endParaRPr lang="en-US"/>
           </a:p>
@@ -1000,7 +1000,7 @@
           <a:p>
             <a:fld id="{78C97017-6FC3-485B-9764-EAC9E56C1D49}" type="datetimeFigureOut">
               <a:rPr lang="en-US" smtClean="0"/>
-              <a:t>3/18/19</a:t>
+              <a:t>4/8/19</a:t>
             </a:fld>
             <a:endParaRPr lang="en-US"/>
           </a:p>
@@ -1168,7 +1168,7 @@
           <a:p>
             <a:fld id="{78C97017-6FC3-485B-9764-EAC9E56C1D49}" type="datetimeFigureOut">
               <a:rPr lang="en-US" smtClean="0"/>
-              <a:t>3/18/19</a:t>
+              <a:t>4/8/19</a:t>
             </a:fld>
             <a:endParaRPr lang="en-US"/>
           </a:p>
@@ -1413,7 +1413,7 @@
           <a:p>
             <a:fld id="{78C97017-6FC3-485B-9764-EAC9E56C1D49}" type="datetimeFigureOut">
               <a:rPr lang="en-US" smtClean="0"/>
-              <a:t>3/18/19</a:t>
+              <a:t>4/8/19</a:t>
             </a:fld>
             <a:endParaRPr lang="en-US"/>
           </a:p>
@@ -1698,7 +1698,7 @@
           <a:p>
             <a:fld id="{78C97017-6FC3-485B-9764-EAC9E56C1D49}" type="datetimeFigureOut">
               <a:rPr lang="en-US" smtClean="0"/>
-              <a:t>3/18/19</a:t>
+              <a:t>4/8/19</a:t>
             </a:fld>
             <a:endParaRPr lang="en-US"/>
           </a:p>
@@ -2117,7 +2117,7 @@
           <a:p>
             <a:fld id="{78C97017-6FC3-485B-9764-EAC9E56C1D49}" type="datetimeFigureOut">
               <a:rPr lang="en-US" smtClean="0"/>
-              <a:t>3/18/19</a:t>
+              <a:t>4/8/19</a:t>
             </a:fld>
             <a:endParaRPr lang="en-US"/>
           </a:p>
@@ -2234,7 +2234,7 @@
           <a:p>
             <a:fld id="{78C97017-6FC3-485B-9764-EAC9E56C1D49}" type="datetimeFigureOut">
               <a:rPr lang="en-US" smtClean="0"/>
-              <a:t>3/18/19</a:t>
+              <a:t>4/8/19</a:t>
             </a:fld>
             <a:endParaRPr lang="en-US"/>
           </a:p>
@@ -2329,7 +2329,7 @@
           <a:p>
             <a:fld id="{78C97017-6FC3-485B-9764-EAC9E56C1D49}" type="datetimeFigureOut">
               <a:rPr lang="en-US" smtClean="0"/>
-              <a:t>3/18/19</a:t>
+              <a:t>4/8/19</a:t>
             </a:fld>
             <a:endParaRPr lang="en-US"/>
           </a:p>
@@ -2604,7 +2604,7 @@
           <a:p>
             <a:fld id="{78C97017-6FC3-485B-9764-EAC9E56C1D49}" type="datetimeFigureOut">
               <a:rPr lang="en-US" smtClean="0"/>
-              <a:t>3/18/19</a:t>
+              <a:t>4/8/19</a:t>
             </a:fld>
             <a:endParaRPr lang="en-US"/>
           </a:p>
@@ -2856,7 +2856,7 @@
           <a:p>
             <a:fld id="{78C97017-6FC3-485B-9764-EAC9E56C1D49}" type="datetimeFigureOut">
               <a:rPr lang="en-US" smtClean="0"/>
-              <a:t>3/18/19</a:t>
+              <a:t>4/8/19</a:t>
             </a:fld>
             <a:endParaRPr lang="en-US"/>
           </a:p>
@@ -3067,7 +3067,7 @@
           <a:p>
             <a:fld id="{78C97017-6FC3-485B-9764-EAC9E56C1D49}" type="datetimeFigureOut">
               <a:rPr lang="en-US" smtClean="0"/>
-              <a:t>3/18/19</a:t>
+              <a:t>4/8/19</a:t>
             </a:fld>
             <a:endParaRPr lang="en-US"/>
           </a:p>
@@ -4703,30 +4703,25 @@
           <a:p>
             <a:pPr algn="ctr"/>
             <a:r>
-              <a:rPr lang="en-US" altLang="zh-CN" sz="1050" dirty="0" smtClean="0">
+              <a:rPr lang="en-US" sz="1000" dirty="0" smtClean="0">
                 <a:solidFill>
                   <a:srgbClr val="7030A0"/>
                 </a:solidFill>
               </a:rPr>
-              <a:t>Admin</a:t>
-            </a:r>
-            <a:r>
-              <a:rPr lang="zh-CN" altLang="en-US" sz="1050" dirty="0" smtClean="0">
+              <a:t>Matric</a:t>
+            </a:r>
+          </a:p>
+          <a:p>
+            <a:pPr algn="ctr"/>
+            <a:r>
+              <a:rPr lang="en-US" sz="1000" dirty="0" smtClean="0">
                 <a:solidFill>
                   <a:srgbClr val="7030A0"/>
                 </a:solidFill>
               </a:rPr>
-              <a:t> </a:t>
-            </a:r>
-            <a:r>
-              <a:rPr lang="en-US" altLang="zh-CN" sz="1050" dirty="0" smtClean="0">
-                <a:solidFill>
-                  <a:srgbClr val="7030A0"/>
-                </a:solidFill>
-              </a:rPr>
-              <a:t>No.</a:t>
-            </a:r>
-            <a:endParaRPr lang="en-SG" sz="1050" dirty="0">
+              <a:t>Number</a:t>
+            </a:r>
+            <a:endParaRPr lang="en-SG" sz="1000" dirty="0">
               <a:solidFill>
                 <a:srgbClr val="7030A0"/>
               </a:solidFill>
@@ -4780,13 +4775,12 @@
           <p:cNvPr id="47" name="Elbow Connector 46"/>
           <p:cNvCxnSpPr>
             <a:cxnSpLocks/>
-            <a:endCxn id="36" idx="1"/>
           </p:cNvCxnSpPr>
           <p:nvPr/>
         </p:nvCxnSpPr>
         <p:spPr>
           <a:xfrm>
-            <a:off x="6303612" y="3524601"/>
+            <a:off x="6282733" y="3534772"/>
             <a:ext cx="400089" cy="29723"/>
           </a:xfrm>
           <a:prstGeom prst="bentConnector3">
@@ -5550,19 +5544,19 @@
           </p:cNvPr>
           <p:cNvCxnSpPr>
             <a:cxnSpLocks/>
-            <a:stCxn id="92" idx="1"/>
-            <a:endCxn id="62" idx="0"/>
+            <a:endCxn id="36" idx="3"/>
           </p:cNvCxnSpPr>
           <p:nvPr/>
         </p:nvCxnSpPr>
         <p:spPr>
-          <a:xfrm rot="5400000">
-            <a:off x="5954027" y="2170031"/>
-            <a:ext cx="859995" cy="1495495"/>
-          </a:xfrm>
-          <a:prstGeom prst="bentConnector3">
+          <a:xfrm rot="16200000" flipH="1">
+            <a:off x="6774726" y="2801292"/>
+            <a:ext cx="1109776" cy="396288"/>
+          </a:xfrm>
+          <a:prstGeom prst="bentConnector4">
             <a:avLst>
-              <a:gd name="adj1" fmla="val 50000"/>
+              <a:gd name="adj1" fmla="val 42287"/>
+              <a:gd name="adj2" fmla="val 157685"/>
             </a:avLst>
           </a:prstGeom>
           <a:ln w="19050">
@@ -5597,7 +5591,7 @@
         </p:nvSpPr>
         <p:spPr>
           <a:xfrm>
-            <a:off x="5373343" y="3174117"/>
+            <a:off x="7571757" y="3582039"/>
             <a:ext cx="189257" cy="178683"/>
           </a:xfrm>
           <a:prstGeom prst="rect">

</xml_diff>